<commit_message>
Updates instruction powerpoint and Added GSR baseline script
</commit_message>
<xml_diff>
--- a/app/bin/win-x64/resources/Instructions.pptx
+++ b/app/bin/win-x64/resources/Instructions.pptx
@@ -248,7 +248,7 @@
           <a:p>
             <a:fld id="{6AAA604D-1FC8-4AD4-9C6F-B169FB5994A9}" type="datetimeFigureOut">
               <a:rPr lang="en-GB" smtClean="0"/>
-              <a:t>07/03/2023</a:t>
+              <a:t>16/03/2023</a:t>
             </a:fld>
             <a:endParaRPr lang="en-GB"/>
           </a:p>
@@ -418,7 +418,7 @@
           <a:p>
             <a:fld id="{6AAA604D-1FC8-4AD4-9C6F-B169FB5994A9}" type="datetimeFigureOut">
               <a:rPr lang="en-GB" smtClean="0"/>
-              <a:t>07/03/2023</a:t>
+              <a:t>16/03/2023</a:t>
             </a:fld>
             <a:endParaRPr lang="en-GB"/>
           </a:p>
@@ -598,7 +598,7 @@
           <a:p>
             <a:fld id="{6AAA604D-1FC8-4AD4-9C6F-B169FB5994A9}" type="datetimeFigureOut">
               <a:rPr lang="en-GB" smtClean="0"/>
-              <a:t>07/03/2023</a:t>
+              <a:t>16/03/2023</a:t>
             </a:fld>
             <a:endParaRPr lang="en-GB"/>
           </a:p>
@@ -768,7 +768,7 @@
           <a:p>
             <a:fld id="{6AAA604D-1FC8-4AD4-9C6F-B169FB5994A9}" type="datetimeFigureOut">
               <a:rPr lang="en-GB" smtClean="0"/>
-              <a:t>07/03/2023</a:t>
+              <a:t>16/03/2023</a:t>
             </a:fld>
             <a:endParaRPr lang="en-GB"/>
           </a:p>
@@ -1014,7 +1014,7 @@
           <a:p>
             <a:fld id="{6AAA604D-1FC8-4AD4-9C6F-B169FB5994A9}" type="datetimeFigureOut">
               <a:rPr lang="en-GB" smtClean="0"/>
-              <a:t>07/03/2023</a:t>
+              <a:t>16/03/2023</a:t>
             </a:fld>
             <a:endParaRPr lang="en-GB"/>
           </a:p>
@@ -1246,7 +1246,7 @@
           <a:p>
             <a:fld id="{6AAA604D-1FC8-4AD4-9C6F-B169FB5994A9}" type="datetimeFigureOut">
               <a:rPr lang="en-GB" smtClean="0"/>
-              <a:t>07/03/2023</a:t>
+              <a:t>16/03/2023</a:t>
             </a:fld>
             <a:endParaRPr lang="en-GB"/>
           </a:p>
@@ -1613,7 +1613,7 @@
           <a:p>
             <a:fld id="{6AAA604D-1FC8-4AD4-9C6F-B169FB5994A9}" type="datetimeFigureOut">
               <a:rPr lang="en-GB" smtClean="0"/>
-              <a:t>07/03/2023</a:t>
+              <a:t>16/03/2023</a:t>
             </a:fld>
             <a:endParaRPr lang="en-GB"/>
           </a:p>
@@ -1731,7 +1731,7 @@
           <a:p>
             <a:fld id="{6AAA604D-1FC8-4AD4-9C6F-B169FB5994A9}" type="datetimeFigureOut">
               <a:rPr lang="en-GB" smtClean="0"/>
-              <a:t>07/03/2023</a:t>
+              <a:t>16/03/2023</a:t>
             </a:fld>
             <a:endParaRPr lang="en-GB"/>
           </a:p>
@@ -1826,7 +1826,7 @@
           <a:p>
             <a:fld id="{6AAA604D-1FC8-4AD4-9C6F-B169FB5994A9}" type="datetimeFigureOut">
               <a:rPr lang="en-GB" smtClean="0"/>
-              <a:t>07/03/2023</a:t>
+              <a:t>16/03/2023</a:t>
             </a:fld>
             <a:endParaRPr lang="en-GB"/>
           </a:p>
@@ -2103,7 +2103,7 @@
           <a:p>
             <a:fld id="{6AAA604D-1FC8-4AD4-9C6F-B169FB5994A9}" type="datetimeFigureOut">
               <a:rPr lang="en-GB" smtClean="0"/>
-              <a:t>07/03/2023</a:t>
+              <a:t>16/03/2023</a:t>
             </a:fld>
             <a:endParaRPr lang="en-GB"/>
           </a:p>
@@ -2360,7 +2360,7 @@
           <a:p>
             <a:fld id="{6AAA604D-1FC8-4AD4-9C6F-B169FB5994A9}" type="datetimeFigureOut">
               <a:rPr lang="en-GB" smtClean="0"/>
-              <a:t>07/03/2023</a:t>
+              <a:t>16/03/2023</a:t>
             </a:fld>
             <a:endParaRPr lang="en-GB"/>
           </a:p>
@@ -2573,7 +2573,7 @@
           <a:p>
             <a:fld id="{6AAA604D-1FC8-4AD4-9C6F-B169FB5994A9}" type="datetimeFigureOut">
               <a:rPr lang="en-GB" smtClean="0"/>
-              <a:t>07/03/2023</a:t>
+              <a:t>16/03/2023</a:t>
             </a:fld>
             <a:endParaRPr lang="en-GB"/>
           </a:p>
@@ -3092,41 +3092,6 @@
           </a:p>
         </p:txBody>
       </p:sp>
-      <p:pic>
-        <p:nvPicPr>
-          <p:cNvPr id="5" name="Content Placeholder 4" descr="A picture containing text&#10;&#10;Description automatically generated">
-            <a:extLst>
-              <a:ext uri="{FF2B5EF4-FFF2-40B4-BE49-F238E27FC236}">
-                <a16:creationId xmlns:a16="http://schemas.microsoft.com/office/drawing/2014/main" id="{89B1307E-941E-3F69-B772-185A6A302434}"/>
-              </a:ext>
-            </a:extLst>
-          </p:cNvPr>
-          <p:cNvPicPr>
-            <a:picLocks noGrp="1" noChangeAspect="1"/>
-          </p:cNvPicPr>
-          <p:nvPr>
-            <p:ph idx="1"/>
-          </p:nvPr>
-        </p:nvPicPr>
-        <p:blipFill>
-          <a:blip r:embed="rId2">
-            <a:extLst>
-              <a:ext uri="{28A0092B-C50C-407E-A947-70E740481C1C}">
-                <a14:useLocalDpi xmlns:a14="http://schemas.microsoft.com/office/drawing/2010/main" val="0"/>
-              </a:ext>
-            </a:extLst>
-          </a:blip>
-          <a:stretch>
-            <a:fillRect/>
-          </a:stretch>
-        </p:blipFill>
-        <p:spPr>
-          <a:xfrm>
-            <a:off x="5068920" y="1949430"/>
-            <a:ext cx="6569009" cy="4122777"/>
-          </a:xfrm>
-        </p:spPr>
-      </p:pic>
       <p:sp>
         <p:nvSpPr>
           <p:cNvPr id="6" name="TextBox 5">
@@ -3203,6 +3168,138 @@
               <a:rPr lang="en-GB" sz="2000" dirty="0"/>
               <a:t>The timer will run faster if you collide into an obstacle, so avoid hitting the walls.</a:t>
             </a:r>
+          </a:p>
+        </p:txBody>
+      </p:sp>
+      <p:pic>
+        <p:nvPicPr>
+          <p:cNvPr id="8" name="Content Placeholder 7">
+            <a:extLst>
+              <a:ext uri="{FF2B5EF4-FFF2-40B4-BE49-F238E27FC236}">
+                <a16:creationId xmlns:a16="http://schemas.microsoft.com/office/drawing/2014/main" id="{0B08B3A8-1B9C-F1A2-E78F-500662FCE1B8}"/>
+              </a:ext>
+            </a:extLst>
+          </p:cNvPr>
+          <p:cNvPicPr>
+            <a:picLocks noGrp="1" noChangeAspect="1"/>
+          </p:cNvPicPr>
+          <p:nvPr>
+            <p:ph idx="1"/>
+          </p:nvPr>
+        </p:nvPicPr>
+        <p:blipFill rotWithShape="1">
+          <a:blip r:embed="rId2"/>
+          <a:srcRect l="15474" r="15800"/>
+          <a:stretch/>
+        </p:blipFill>
+        <p:spPr>
+          <a:xfrm>
+            <a:off x="5415295" y="1774581"/>
+            <a:ext cx="5980301" cy="4495799"/>
+          </a:xfrm>
+        </p:spPr>
+      </p:pic>
+      <p:sp>
+        <p:nvSpPr>
+          <p:cNvPr id="9" name="Oval 8">
+            <a:extLst>
+              <a:ext uri="{FF2B5EF4-FFF2-40B4-BE49-F238E27FC236}">
+                <a16:creationId xmlns:a16="http://schemas.microsoft.com/office/drawing/2014/main" id="{194DFA0D-EC5F-21C6-8CB2-89C3B7C07BB7}"/>
+              </a:ext>
+            </a:extLst>
+          </p:cNvPr>
+          <p:cNvSpPr/>
+          <p:nvPr/>
+        </p:nvSpPr>
+        <p:spPr>
+          <a:xfrm>
+            <a:off x="7197971" y="3798276"/>
+            <a:ext cx="451336" cy="448408"/>
+          </a:xfrm>
+          <a:prstGeom prst="ellipse">
+            <a:avLst/>
+          </a:prstGeom>
+          <a:noFill/>
+          <a:ln w="76200">
+            <a:solidFill>
+              <a:srgbClr val="FF0000"/>
+            </a:solidFill>
+          </a:ln>
+        </p:spPr>
+        <p:style>
+          <a:lnRef idx="2">
+            <a:schemeClr val="accent1">
+              <a:shade val="50000"/>
+            </a:schemeClr>
+          </a:lnRef>
+          <a:fillRef idx="1">
+            <a:schemeClr val="accent1"/>
+          </a:fillRef>
+          <a:effectRef idx="0">
+            <a:schemeClr val="accent1"/>
+          </a:effectRef>
+          <a:fontRef idx="minor">
+            <a:schemeClr val="lt1"/>
+          </a:fontRef>
+        </p:style>
+        <p:txBody>
+          <a:bodyPr rtlCol="0" anchor="ctr"/>
+          <a:lstStyle/>
+          <a:p>
+            <a:pPr algn="ctr"/>
+            <a:endParaRPr lang="en-GB"/>
+          </a:p>
+        </p:txBody>
+      </p:sp>
+      <p:sp>
+        <p:nvSpPr>
+          <p:cNvPr id="10" name="Oval 9">
+            <a:extLst>
+              <a:ext uri="{FF2B5EF4-FFF2-40B4-BE49-F238E27FC236}">
+                <a16:creationId xmlns:a16="http://schemas.microsoft.com/office/drawing/2014/main" id="{76AAD8E5-FA1E-F93E-3AA6-BC55EA731498}"/>
+              </a:ext>
+            </a:extLst>
+          </p:cNvPr>
+          <p:cNvSpPr/>
+          <p:nvPr/>
+        </p:nvSpPr>
+        <p:spPr>
+          <a:xfrm>
+            <a:off x="6418389" y="3857998"/>
+            <a:ext cx="451336" cy="448408"/>
+          </a:xfrm>
+          <a:prstGeom prst="ellipse">
+            <a:avLst/>
+          </a:prstGeom>
+          <a:noFill/>
+          <a:ln w="76200">
+            <a:solidFill>
+              <a:srgbClr val="00B050"/>
+            </a:solidFill>
+          </a:ln>
+        </p:spPr>
+        <p:style>
+          <a:lnRef idx="2">
+            <a:schemeClr val="accent1">
+              <a:shade val="50000"/>
+            </a:schemeClr>
+          </a:lnRef>
+          <a:fillRef idx="1">
+            <a:schemeClr val="accent1"/>
+          </a:fillRef>
+          <a:effectRef idx="0">
+            <a:schemeClr val="accent1"/>
+          </a:effectRef>
+          <a:fontRef idx="minor">
+            <a:schemeClr val="lt1"/>
+          </a:fontRef>
+        </p:style>
+        <p:txBody>
+          <a:bodyPr rtlCol="0" anchor="ctr"/>
+          <a:lstStyle/>
+          <a:p>
+            <a:pPr algn="ctr"/>
+            <a:endParaRPr lang="en-GB"/>
           </a:p>
         </p:txBody>
       </p:sp>
@@ -3514,7 +3611,7 @@
         <p:spPr>
           <a:xfrm>
             <a:off x="738554" y="1690688"/>
-            <a:ext cx="5231423" cy="2585323"/>
+            <a:ext cx="5231423" cy="4339650"/>
           </a:xfrm>
           <a:prstGeom prst="rect">
             <a:avLst/>
@@ -3532,7 +3629,7 @@
               <a:buChar char="•"/>
             </a:pPr>
             <a:r>
-              <a:rPr lang="en-GB" dirty="0"/>
+              <a:rPr lang="en-GB" sz="2400" dirty="0"/>
               <a:t>During the study you will be asked to wear a set of sensors to monitor your skin conductance level.</a:t>
             </a:r>
           </a:p>
@@ -3542,7 +3639,7 @@
               <a:buChar char="•"/>
             </a:pPr>
             <a:r>
-              <a:rPr lang="en-GB" dirty="0"/>
+              <a:rPr lang="en-GB" sz="2400" dirty="0"/>
               <a:t>These will be similar to those that exist in smart watches and their use has no adverse effects.</a:t>
             </a:r>
           </a:p>
@@ -3552,7 +3649,7 @@
               <a:buChar char="•"/>
             </a:pPr>
             <a:r>
-              <a:rPr lang="en-GB" dirty="0"/>
+              <a:rPr lang="en-GB" sz="2400" dirty="0"/>
               <a:t>Please place the electrodes at the base of your fingers of your non-dominant hand as instructed by the experimenter.</a:t>
             </a:r>
           </a:p>
@@ -3678,6 +3775,16 @@
             <a:r>
               <a:rPr lang="en-GB" dirty="0"/>
               <a:t>You will play a practice game to see an example of robot control takeover.</a:t>
+            </a:r>
+          </a:p>
+          <a:p>
+            <a:pPr marL="285750" indent="-285750">
+              <a:buFont typeface="Arial" panose="020B0604020202020204" pitchFamily="34" charset="0"/>
+              <a:buChar char="•"/>
+            </a:pPr>
+            <a:r>
+              <a:rPr lang="en-GB" dirty="0"/>
+              <a:t>After the practice, you will take a minute long GSR baseline reading before the experiment begins.</a:t>
             </a:r>
           </a:p>
           <a:p>

</xml_diff>

<commit_message>
Updated instructions and documentation
</commit_message>
<xml_diff>
--- a/app/bin/win-x64/resources/Instructions.pptx
+++ b/app/bin/win-x64/resources/Instructions.pptx
@@ -10,7 +10,6 @@
     <p:sldId id="258" r:id="rId4"/>
     <p:sldId id="259" r:id="rId5"/>
     <p:sldId id="261" r:id="rId6"/>
-    <p:sldId id="262" r:id="rId7"/>
   </p:sldIdLst>
   <p:sldSz cx="12192000" cy="6858000"/>
   <p:notesSz cx="6858000" cy="9144000"/>
@@ -248,7 +247,7 @@
           <a:p>
             <a:fld id="{6AAA604D-1FC8-4AD4-9C6F-B169FB5994A9}" type="datetimeFigureOut">
               <a:rPr lang="en-GB" smtClean="0"/>
-              <a:t>16/03/2023</a:t>
+              <a:t>23/03/2023</a:t>
             </a:fld>
             <a:endParaRPr lang="en-GB"/>
           </a:p>
@@ -418,7 +417,7 @@
           <a:p>
             <a:fld id="{6AAA604D-1FC8-4AD4-9C6F-B169FB5994A9}" type="datetimeFigureOut">
               <a:rPr lang="en-GB" smtClean="0"/>
-              <a:t>16/03/2023</a:t>
+              <a:t>23/03/2023</a:t>
             </a:fld>
             <a:endParaRPr lang="en-GB"/>
           </a:p>
@@ -598,7 +597,7 @@
           <a:p>
             <a:fld id="{6AAA604D-1FC8-4AD4-9C6F-B169FB5994A9}" type="datetimeFigureOut">
               <a:rPr lang="en-GB" smtClean="0"/>
-              <a:t>16/03/2023</a:t>
+              <a:t>23/03/2023</a:t>
             </a:fld>
             <a:endParaRPr lang="en-GB"/>
           </a:p>
@@ -768,7 +767,7 @@
           <a:p>
             <a:fld id="{6AAA604D-1FC8-4AD4-9C6F-B169FB5994A9}" type="datetimeFigureOut">
               <a:rPr lang="en-GB" smtClean="0"/>
-              <a:t>16/03/2023</a:t>
+              <a:t>23/03/2023</a:t>
             </a:fld>
             <a:endParaRPr lang="en-GB"/>
           </a:p>
@@ -1014,7 +1013,7 @@
           <a:p>
             <a:fld id="{6AAA604D-1FC8-4AD4-9C6F-B169FB5994A9}" type="datetimeFigureOut">
               <a:rPr lang="en-GB" smtClean="0"/>
-              <a:t>16/03/2023</a:t>
+              <a:t>23/03/2023</a:t>
             </a:fld>
             <a:endParaRPr lang="en-GB"/>
           </a:p>
@@ -1246,7 +1245,7 @@
           <a:p>
             <a:fld id="{6AAA604D-1FC8-4AD4-9C6F-B169FB5994A9}" type="datetimeFigureOut">
               <a:rPr lang="en-GB" smtClean="0"/>
-              <a:t>16/03/2023</a:t>
+              <a:t>23/03/2023</a:t>
             </a:fld>
             <a:endParaRPr lang="en-GB"/>
           </a:p>
@@ -1613,7 +1612,7 @@
           <a:p>
             <a:fld id="{6AAA604D-1FC8-4AD4-9C6F-B169FB5994A9}" type="datetimeFigureOut">
               <a:rPr lang="en-GB" smtClean="0"/>
-              <a:t>16/03/2023</a:t>
+              <a:t>23/03/2023</a:t>
             </a:fld>
             <a:endParaRPr lang="en-GB"/>
           </a:p>
@@ -1731,7 +1730,7 @@
           <a:p>
             <a:fld id="{6AAA604D-1FC8-4AD4-9C6F-B169FB5994A9}" type="datetimeFigureOut">
               <a:rPr lang="en-GB" smtClean="0"/>
-              <a:t>16/03/2023</a:t>
+              <a:t>23/03/2023</a:t>
             </a:fld>
             <a:endParaRPr lang="en-GB"/>
           </a:p>
@@ -1826,7 +1825,7 @@
           <a:p>
             <a:fld id="{6AAA604D-1FC8-4AD4-9C6F-B169FB5994A9}" type="datetimeFigureOut">
               <a:rPr lang="en-GB" smtClean="0"/>
-              <a:t>16/03/2023</a:t>
+              <a:t>23/03/2023</a:t>
             </a:fld>
             <a:endParaRPr lang="en-GB"/>
           </a:p>
@@ -2103,7 +2102,7 @@
           <a:p>
             <a:fld id="{6AAA604D-1FC8-4AD4-9C6F-B169FB5994A9}" type="datetimeFigureOut">
               <a:rPr lang="en-GB" smtClean="0"/>
-              <a:t>16/03/2023</a:t>
+              <a:t>23/03/2023</a:t>
             </a:fld>
             <a:endParaRPr lang="en-GB"/>
           </a:p>
@@ -2360,7 +2359,7 @@
           <a:p>
             <a:fld id="{6AAA604D-1FC8-4AD4-9C6F-B169FB5994A9}" type="datetimeFigureOut">
               <a:rPr lang="en-GB" smtClean="0"/>
-              <a:t>16/03/2023</a:t>
+              <a:t>23/03/2023</a:t>
             </a:fld>
             <a:endParaRPr lang="en-GB"/>
           </a:p>
@@ -2573,7 +2572,7 @@
           <a:p>
             <a:fld id="{6AAA604D-1FC8-4AD4-9C6F-B169FB5994A9}" type="datetimeFigureOut">
               <a:rPr lang="en-GB" smtClean="0"/>
-              <a:t>16/03/2023</a:t>
+              <a:t>23/03/2023</a:t>
             </a:fld>
             <a:endParaRPr lang="en-GB"/>
           </a:p>
@@ -3107,7 +3106,7 @@
         <p:spPr>
           <a:xfrm>
             <a:off x="457200" y="1573823"/>
-            <a:ext cx="3780692" cy="5016758"/>
+            <a:ext cx="3780692" cy="5324535"/>
           </a:xfrm>
           <a:prstGeom prst="rect">
             <a:avLst/>
@@ -3136,7 +3135,7 @@
             </a:pPr>
             <a:r>
               <a:rPr lang="en-GB" sz="2000" dirty="0"/>
-              <a:t>In each game, you will visit 8 targets.</a:t>
+              <a:t>In each game, you will visit 8 targets. This will be repeated five times.</a:t>
             </a:r>
           </a:p>
           <a:p>
@@ -3166,7 +3165,7 @@
             </a:pPr>
             <a:r>
               <a:rPr lang="en-GB" sz="2000" dirty="0"/>
-              <a:t>The timer will run faster if you collide into an obstacle, so avoid hitting the walls.</a:t>
+              <a:t>You will be penalised if you collide into an obstacle, so avoid hitting the walls.</a:t>
             </a:r>
           </a:p>
         </p:txBody>
@@ -3745,7 +3744,9 @@
         </p:nvSpPr>
         <p:spPr/>
         <p:txBody>
-          <a:bodyPr/>
+          <a:bodyPr>
+            <a:normAutofit fontScale="92500" lnSpcReduction="10000"/>
+          </a:bodyPr>
           <a:lstStyle/>
           <a:p>
             <a:pPr marL="285750" indent="-285750">
@@ -3788,6 +3789,16 @@
             </a:r>
           </a:p>
           <a:p>
+            <a:pPr marL="285750" indent="-285750">
+              <a:buFont typeface="Arial" panose="020B0604020202020204" pitchFamily="34" charset="0"/>
+              <a:buChar char="•"/>
+            </a:pPr>
+            <a:r>
+              <a:rPr lang="en-GB" dirty="0"/>
+              <a:t>After every experiment, you will be asked to complete a questionnaire to give feedback on your experience.</a:t>
+            </a:r>
+          </a:p>
+          <a:p>
             <a:endParaRPr lang="en-GB" dirty="0"/>
           </a:p>
         </p:txBody>
@@ -3796,125 +3807,6 @@
     <p:extLst>
       <p:ext uri="{BB962C8B-B14F-4D97-AF65-F5344CB8AC3E}">
         <p14:creationId xmlns:p14="http://schemas.microsoft.com/office/powerpoint/2010/main" val="1184795687"/>
-      </p:ext>
-    </p:extLst>
-  </p:cSld>
-  <p:clrMapOvr>
-    <a:masterClrMapping/>
-  </p:clrMapOvr>
-</p:sld>
-</file>
-
-<file path=ppt/slides/slide6.xml><?xml version="1.0" encoding="utf-8"?>
-<p:sld xmlns:a="http://schemas.openxmlformats.org/drawingml/2006/main" xmlns:r="http://schemas.openxmlformats.org/officeDocument/2006/relationships" xmlns:p="http://schemas.openxmlformats.org/presentationml/2006/main">
-  <p:cSld>
-    <p:spTree>
-      <p:nvGrpSpPr>
-        <p:cNvPr id="1" name=""/>
-        <p:cNvGrpSpPr/>
-        <p:nvPr/>
-      </p:nvGrpSpPr>
-      <p:grpSpPr>
-        <a:xfrm>
-          <a:off x="0" y="0"/>
-          <a:ext cx="0" cy="0"/>
-          <a:chOff x="0" y="0"/>
-          <a:chExt cx="0" cy="0"/>
-        </a:xfrm>
-      </p:grpSpPr>
-      <p:sp>
-        <p:nvSpPr>
-          <p:cNvPr id="2" name="Title 1">
-            <a:extLst>
-              <a:ext uri="{FF2B5EF4-FFF2-40B4-BE49-F238E27FC236}">
-                <a16:creationId xmlns:a16="http://schemas.microsoft.com/office/drawing/2014/main" id="{5A247930-5EEF-128D-3593-8FEACA2B604C}"/>
-              </a:ext>
-            </a:extLst>
-          </p:cNvPr>
-          <p:cNvSpPr>
-            <a:spLocks noGrp="1"/>
-          </p:cNvSpPr>
-          <p:nvPr>
-            <p:ph type="title"/>
-          </p:nvPr>
-        </p:nvSpPr>
-        <p:spPr/>
-        <p:txBody>
-          <a:bodyPr/>
-          <a:lstStyle/>
-          <a:p>
-            <a:r>
-              <a:rPr lang="en-GB" dirty="0"/>
-              <a:t>Experimental protocol</a:t>
-            </a:r>
-          </a:p>
-        </p:txBody>
-      </p:sp>
-      <p:sp>
-        <p:nvSpPr>
-          <p:cNvPr id="3" name="Content Placeholder 2">
-            <a:extLst>
-              <a:ext uri="{FF2B5EF4-FFF2-40B4-BE49-F238E27FC236}">
-                <a16:creationId xmlns:a16="http://schemas.microsoft.com/office/drawing/2014/main" id="{4FEE0179-AEF4-760C-DEE3-F21BF44030BC}"/>
-              </a:ext>
-            </a:extLst>
-          </p:cNvPr>
-          <p:cNvSpPr>
-            <a:spLocks noGrp="1"/>
-          </p:cNvSpPr>
-          <p:nvPr>
-            <p:ph idx="1"/>
-          </p:nvPr>
-        </p:nvSpPr>
-        <p:spPr/>
-        <p:txBody>
-          <a:bodyPr/>
-          <a:lstStyle/>
-          <a:p>
-            <a:r>
-              <a:rPr lang="en-GB" dirty="0"/>
-              <a:t>Consent -- Demographics questionnaire</a:t>
-            </a:r>
-          </a:p>
-          <a:p>
-            <a:r>
-              <a:rPr lang="en-GB" dirty="0"/>
-              <a:t>Practice session – blank scene or an easier scene where there is no guidance – they finish at their own time  no longer than 5 minutes</a:t>
-            </a:r>
-          </a:p>
-          <a:p>
-            <a:r>
-              <a:rPr lang="en-GB" dirty="0"/>
-              <a:t>Baseline GSR close your eyes think of holiday</a:t>
-            </a:r>
-          </a:p>
-          <a:p>
-            <a:r>
-              <a:rPr lang="en-GB" dirty="0"/>
-              <a:t>Session A – 5 trials x 8 targets</a:t>
-            </a:r>
-          </a:p>
-          <a:p>
-            <a:r>
-              <a:rPr lang="en-GB" dirty="0"/>
-              <a:t>Questionnaire </a:t>
-            </a:r>
-          </a:p>
-          <a:p>
-            <a:r>
-              <a:rPr lang="en-GB" dirty="0"/>
-              <a:t>B,C,D</a:t>
-            </a:r>
-          </a:p>
-          <a:p>
-            <a:endParaRPr lang="en-GB" dirty="0"/>
-          </a:p>
-        </p:txBody>
-      </p:sp>
-    </p:spTree>
-    <p:extLst>
-      <p:ext uri="{BB962C8B-B14F-4D97-AF65-F5344CB8AC3E}">
-        <p14:creationId xmlns:p14="http://schemas.microsoft.com/office/powerpoint/2010/main" val="1022983115"/>
       </p:ext>
     </p:extLst>
   </p:cSld>

</xml_diff>